<commit_message>
add 8 projects in total
</commit_message>
<xml_diff>
--- a/ResponsiveWebDesign/JingchengWangPortfolio/img/image.pptx
+++ b/ResponsiveWebDesign/JingchengWangPortfolio/img/image.pptx
@@ -5,10 +5,12 @@
     <p:sldMasterId id="2147483648" r:id="rId1"/>
   </p:sldMasterIdLst>
   <p:notesMasterIdLst>
-    <p:notesMasterId r:id="rId3"/>
+    <p:notesMasterId r:id="rId5"/>
   </p:notesMasterIdLst>
   <p:sldIdLst>
     <p:sldId id="256" r:id="rId2"/>
+    <p:sldId id="257" r:id="rId3"/>
+    <p:sldId id="258" r:id="rId4"/>
   </p:sldIdLst>
   <p:sldSz cx="12192000" cy="6858000"/>
   <p:notesSz cx="6858000" cy="9144000"/>
@@ -107,6 +109,11 @@
       </a:defRPr>
     </a:lvl9pPr>
   </p:defaultTextStyle>
+  <p:extLst>
+    <p:ext uri="{EFAFB233-063F-42B5-8137-9DF3F51BA10A}">
+      <p15:sldGuideLst xmlns:p15="http://schemas.microsoft.com/office/powerpoint/2012/main"/>
+    </p:ext>
+  </p:extLst>
 </p:presentation>
 </file>
 
@@ -3550,10 +3557,291 @@
           </a:p>
         </p:txBody>
       </p:sp>
+      <p:sp>
+        <p:nvSpPr>
+          <p:cNvPr id="6" name="矩形 5"/>
+          <p:cNvSpPr/>
+          <p:nvPr/>
+        </p:nvSpPr>
+        <p:spPr>
+          <a:xfrm>
+            <a:off x="6321082" y="3185769"/>
+            <a:ext cx="1422184" cy="646331"/>
+          </a:xfrm>
+          <a:prstGeom prst="rect">
+            <a:avLst/>
+          </a:prstGeom>
+          <a:noFill/>
+        </p:spPr>
+        <p:txBody>
+          <a:bodyPr wrap="none" lIns="91440" tIns="45720" rIns="91440" bIns="45720">
+            <a:spAutoFit/>
+          </a:bodyPr>
+          <a:lstStyle/>
+          <a:p>
+            <a:pPr algn="ctr"/>
+            <a:r>
+              <a:rPr lang="en-US" altLang="zh-CN" sz="3600" b="1" cap="none" spc="0" dirty="0" smtClean="0">
+                <a:ln w="9525">
+                  <a:solidFill>
+                    <a:schemeClr val="bg1"/>
+                  </a:solidFill>
+                  <a:prstDash val="solid"/>
+                </a:ln>
+                <a:solidFill>
+                  <a:srgbClr val="2847E0"/>
+                </a:solidFill>
+                <a:effectLst>
+                  <a:outerShdw blurRad="12700" dist="38100" dir="2700000" algn="tl" rotWithShape="0">
+                    <a:schemeClr val="accent5">
+                      <a:lumMod val="60000"/>
+                      <a:lumOff val="40000"/>
+                    </a:schemeClr>
+                  </a:outerShdw>
+                </a:effectLst>
+                <a:latin typeface="Candara" panose="020E0502030303020204" pitchFamily="34" charset="0"/>
+              </a:rPr>
+              <a:t>studio</a:t>
+            </a:r>
+            <a:endParaRPr lang="zh-CN" altLang="en-US" sz="3600" b="1" cap="none" spc="0" dirty="0">
+              <a:ln w="9525">
+                <a:solidFill>
+                  <a:schemeClr val="bg1"/>
+                </a:solidFill>
+                <a:prstDash val="solid"/>
+              </a:ln>
+              <a:solidFill>
+                <a:srgbClr val="2847E0"/>
+              </a:solidFill>
+              <a:effectLst>
+                <a:outerShdw blurRad="12700" dist="38100" dir="2700000" algn="tl" rotWithShape="0">
+                  <a:schemeClr val="accent5">
+                    <a:lumMod val="60000"/>
+                    <a:lumOff val="40000"/>
+                  </a:schemeClr>
+                </a:outerShdw>
+              </a:effectLst>
+              <a:latin typeface="Candara" panose="020E0502030303020204" pitchFamily="34" charset="0"/>
+            </a:endParaRPr>
+          </a:p>
+        </p:txBody>
+      </p:sp>
     </p:spTree>
     <p:extLst>
       <p:ext uri="{BB962C8B-B14F-4D97-AF65-F5344CB8AC3E}">
         <p14:creationId xmlns:p14="http://schemas.microsoft.com/office/powerpoint/2010/main" val="2508165858"/>
+      </p:ext>
+    </p:extLst>
+  </p:cSld>
+  <p:clrMapOvr>
+    <a:masterClrMapping/>
+  </p:clrMapOvr>
+</p:sld>
+</file>
+
+<file path=ppt/slides/slide2.xml><?xml version="1.0" encoding="utf-8"?>
+<p:sld xmlns:a="http://schemas.openxmlformats.org/drawingml/2006/main" xmlns:r="http://schemas.openxmlformats.org/officeDocument/2006/relationships" xmlns:p="http://schemas.openxmlformats.org/presentationml/2006/main">
+  <p:cSld>
+    <p:spTree>
+      <p:nvGrpSpPr>
+        <p:cNvPr id="1" name=""/>
+        <p:cNvGrpSpPr/>
+        <p:nvPr/>
+      </p:nvGrpSpPr>
+      <p:grpSpPr>
+        <a:xfrm>
+          <a:off x="0" y="0"/>
+          <a:ext cx="0" cy="0"/>
+          <a:chOff x="0" y="0"/>
+          <a:chExt cx="0" cy="0"/>
+        </a:xfrm>
+      </p:grpSpPr>
+      <p:sp>
+        <p:nvSpPr>
+          <p:cNvPr id="5" name="矩形 4"/>
+          <p:cNvSpPr/>
+          <p:nvPr/>
+        </p:nvSpPr>
+        <p:spPr>
+          <a:xfrm>
+            <a:off x="2525485" y="0"/>
+            <a:ext cx="6858000" cy="6858000"/>
+          </a:xfrm>
+          <a:prstGeom prst="rect">
+            <a:avLst/>
+          </a:prstGeom>
+          <a:solidFill>
+            <a:schemeClr val="bg1"/>
+          </a:solidFill>
+          <a:ln>
+            <a:noFill/>
+          </a:ln>
+        </p:spPr>
+        <p:style>
+          <a:lnRef idx="2">
+            <a:schemeClr val="accent1">
+              <a:shade val="50000"/>
+            </a:schemeClr>
+          </a:lnRef>
+          <a:fillRef idx="1">
+            <a:schemeClr val="accent1"/>
+          </a:fillRef>
+          <a:effectRef idx="0">
+            <a:schemeClr val="accent1"/>
+          </a:effectRef>
+          <a:fontRef idx="minor">
+            <a:schemeClr val="lt1"/>
+          </a:fontRef>
+        </p:style>
+        <p:txBody>
+          <a:bodyPr rtlCol="0" anchor="ctr"/>
+          <a:lstStyle/>
+          <a:p>
+            <a:pPr algn="ctr"/>
+            <a:endParaRPr lang="zh-CN" altLang="en-US"/>
+          </a:p>
+        </p:txBody>
+      </p:sp>
+      <p:pic>
+        <p:nvPicPr>
+          <p:cNvPr id="4" name="图片 3"/>
+          <p:cNvPicPr>
+            <a:picLocks noChangeAspect="1"/>
+          </p:cNvPicPr>
+          <p:nvPr/>
+        </p:nvPicPr>
+        <p:blipFill>
+          <a:blip r:embed="rId2">
+            <a:extLst>
+              <a:ext uri="{28A0092B-C50C-407E-A947-70E740481C1C}">
+                <a14:useLocalDpi xmlns:a14="http://schemas.microsoft.com/office/drawing/2010/main" val="0"/>
+              </a:ext>
+            </a:extLst>
+          </a:blip>
+          <a:stretch>
+            <a:fillRect/>
+          </a:stretch>
+        </p:blipFill>
+        <p:spPr>
+          <a:xfrm>
+            <a:off x="2525485" y="1166107"/>
+            <a:ext cx="6858000" cy="4525785"/>
+          </a:xfrm>
+          <a:prstGeom prst="rect">
+            <a:avLst/>
+          </a:prstGeom>
+        </p:spPr>
+      </p:pic>
+    </p:spTree>
+    <p:extLst>
+      <p:ext uri="{BB962C8B-B14F-4D97-AF65-F5344CB8AC3E}">
+        <p14:creationId xmlns:p14="http://schemas.microsoft.com/office/powerpoint/2010/main" val="736026702"/>
+      </p:ext>
+    </p:extLst>
+  </p:cSld>
+  <p:clrMapOvr>
+    <a:masterClrMapping/>
+  </p:clrMapOvr>
+</p:sld>
+</file>
+
+<file path=ppt/slides/slide3.xml><?xml version="1.0" encoding="utf-8"?>
+<p:sld xmlns:a="http://schemas.openxmlformats.org/drawingml/2006/main" xmlns:r="http://schemas.openxmlformats.org/officeDocument/2006/relationships" xmlns:p="http://schemas.openxmlformats.org/presentationml/2006/main">
+  <p:cSld>
+    <p:spTree>
+      <p:nvGrpSpPr>
+        <p:cNvPr id="1" name=""/>
+        <p:cNvGrpSpPr/>
+        <p:nvPr/>
+      </p:nvGrpSpPr>
+      <p:grpSpPr>
+        <a:xfrm>
+          <a:off x="0" y="0"/>
+          <a:ext cx="0" cy="0"/>
+          <a:chOff x="0" y="0"/>
+          <a:chExt cx="0" cy="0"/>
+        </a:xfrm>
+      </p:grpSpPr>
+      <p:sp>
+        <p:nvSpPr>
+          <p:cNvPr id="5" name="矩形 4"/>
+          <p:cNvSpPr/>
+          <p:nvPr/>
+        </p:nvSpPr>
+        <p:spPr>
+          <a:xfrm>
+            <a:off x="2525485" y="0"/>
+            <a:ext cx="6858000" cy="6858000"/>
+          </a:xfrm>
+          <a:prstGeom prst="rect">
+            <a:avLst/>
+          </a:prstGeom>
+          <a:solidFill>
+            <a:schemeClr val="bg1"/>
+          </a:solidFill>
+          <a:ln>
+            <a:noFill/>
+          </a:ln>
+        </p:spPr>
+        <p:style>
+          <a:lnRef idx="2">
+            <a:schemeClr val="accent1">
+              <a:shade val="50000"/>
+            </a:schemeClr>
+          </a:lnRef>
+          <a:fillRef idx="1">
+            <a:schemeClr val="accent1"/>
+          </a:fillRef>
+          <a:effectRef idx="0">
+            <a:schemeClr val="accent1"/>
+          </a:effectRef>
+          <a:fontRef idx="minor">
+            <a:schemeClr val="lt1"/>
+          </a:fontRef>
+        </p:style>
+        <p:txBody>
+          <a:bodyPr rtlCol="0" anchor="ctr"/>
+          <a:lstStyle/>
+          <a:p>
+            <a:pPr algn="ctr"/>
+            <a:endParaRPr lang="zh-CN" altLang="en-US"/>
+          </a:p>
+        </p:txBody>
+      </p:sp>
+      <p:pic>
+        <p:nvPicPr>
+          <p:cNvPr id="3" name="图片 2"/>
+          <p:cNvPicPr>
+            <a:picLocks noChangeAspect="1"/>
+          </p:cNvPicPr>
+          <p:nvPr/>
+        </p:nvPicPr>
+        <p:blipFill>
+          <a:blip r:embed="rId2" cstate="print">
+            <a:extLst>
+              <a:ext uri="{28A0092B-C50C-407E-A947-70E740481C1C}">
+                <a14:useLocalDpi xmlns:a14="http://schemas.microsoft.com/office/drawing/2010/main" val="0"/>
+              </a:ext>
+            </a:extLst>
+          </a:blip>
+          <a:stretch>
+            <a:fillRect/>
+          </a:stretch>
+        </p:blipFill>
+        <p:spPr>
+          <a:xfrm>
+            <a:off x="2525485" y="1772191"/>
+            <a:ext cx="6858000" cy="3313618"/>
+          </a:xfrm>
+          <a:prstGeom prst="rect">
+            <a:avLst/>
+          </a:prstGeom>
+        </p:spPr>
+      </p:pic>
+    </p:spTree>
+    <p:extLst>
+      <p:ext uri="{BB962C8B-B14F-4D97-AF65-F5344CB8AC3E}">
+        <p14:creationId xmlns:p14="http://schemas.microsoft.com/office/powerpoint/2010/main" val="2964411700"/>
       </p:ext>
     </p:extLst>
   </p:cSld>

</xml_diff>